<commit_message>
Removed bugs form 4th question compare function
</commit_message>
<xml_diff>
--- a/Code/M7/201EC226-M7.pptx
+++ b/Code/M7/201EC226-M7.pptx
@@ -240,7 +240,7 @@
           <a:p>
             <a:fld id="{963396E7-87BF-864A-BE04-A221C272D6E1}" type="datetimeFigureOut">
               <a:rPr lang="en-US" smtClean="0"/>
-              <a:t>7/28/2021</a:t>
+              <a:t>8/1/2021</a:t>
             </a:fld>
             <a:endParaRPr lang="en-US" dirty="0"/>
           </a:p>
@@ -417,7 +417,7 @@
           <a:p>
             <a:fld id="{D9BDC7F0-27B3-48E7-9288-964E7EEDAEE4}" type="datetimeFigureOut">
               <a:rPr lang="en-US" smtClean="0"/>
-              <a:t>7/28/2021</a:t>
+              <a:t>8/1/2021</a:t>
             </a:fld>
             <a:endParaRPr lang="en-US" dirty="0"/>
           </a:p>
@@ -26899,7 +26899,7 @@
         <p:spPr>
           <a:xfrm>
             <a:off x="334597" y="324683"/>
-            <a:ext cx="8794934" cy="8494633"/>
+            <a:ext cx="8794934" cy="8009885"/>
           </a:xfrm>
           <a:prstGeom prst="rect">
             <a:avLst/>
@@ -28519,14 +28519,13 @@
           </a:p>
           <a:p>
             <a:r>
-              <a:rPr lang="en-IN" sz="1050" b="0" dirty="0">
-                <a:solidFill>
-                  <a:srgbClr val="383A42"/>
-                </a:solidFill>
-                <a:effectLst/>
-                <a:latin typeface="Consolas" panose="020B0609020204030204" pitchFamily="49" charset="0"/>
-              </a:rPr>
-              <a:t>    </a:t>
+              <a:rPr lang="en-IN" sz="1050" dirty="0">
+                <a:solidFill>
+                  <a:srgbClr val="A626A4"/>
+                </a:solidFill>
+                <a:latin typeface="Consolas" panose="020B0609020204030204" pitchFamily="49" charset="0"/>
+              </a:rPr>
+              <a:t>   </a:t>
             </a:r>
             <a:r>
               <a:rPr lang="en-IN" sz="1050" b="0" dirty="0">
@@ -29218,7 +29217,7 @@
                 <a:effectLst/>
                 <a:latin typeface="Consolas" panose="020B0609020204030204" pitchFamily="49" charset="0"/>
               </a:rPr>
-              <a:t>1</a:t>
+              <a:t>0</a:t>
             </a:r>
             <a:r>
               <a:rPr lang="en-IN" sz="1050" b="0" dirty="0">
@@ -29270,301 +29269,27 @@
                 <a:effectLst/>
                 <a:latin typeface="Consolas" panose="020B0609020204030204" pitchFamily="49" charset="0"/>
               </a:rPr>
+              <a:t>"Same Strings</a:t>
+            </a:r>
+            <a:r>
+              <a:rPr lang="en-IN" sz="1050" b="0" dirty="0">
+                <a:solidFill>
+                  <a:srgbClr val="0184BC"/>
+                </a:solidFill>
+                <a:effectLst/>
+                <a:latin typeface="Consolas" panose="020B0609020204030204" pitchFamily="49" charset="0"/>
+              </a:rPr>
+              <a:t>\n</a:t>
+            </a:r>
+            <a:r>
+              <a:rPr lang="en-IN" sz="1050" b="0" dirty="0">
+                <a:solidFill>
+                  <a:srgbClr val="50A14F"/>
+                </a:solidFill>
+                <a:effectLst/>
+                <a:latin typeface="Consolas" panose="020B0609020204030204" pitchFamily="49" charset="0"/>
+              </a:rPr>
               <a:t>"</a:t>
-            </a:r>
-            <a:r>
-              <a:rPr lang="en-IN" sz="1050" b="0" dirty="0">
-                <a:solidFill>
-                  <a:srgbClr val="986801"/>
-                </a:solidFill>
-                <a:effectLst/>
-                <a:latin typeface="Consolas" panose="020B0609020204030204" pitchFamily="49" charset="0"/>
-              </a:rPr>
-              <a:t>%s</a:t>
-            </a:r>
-            <a:r>
-              <a:rPr lang="en-IN" sz="1050" b="0" dirty="0">
-                <a:solidFill>
-                  <a:srgbClr val="50A14F"/>
-                </a:solidFill>
-                <a:effectLst/>
-                <a:latin typeface="Consolas" panose="020B0609020204030204" pitchFamily="49" charset="0"/>
-              </a:rPr>
-              <a:t> is larger</a:t>
-            </a:r>
-            <a:r>
-              <a:rPr lang="en-IN" sz="1050" b="0" dirty="0">
-                <a:solidFill>
-                  <a:srgbClr val="0184BC"/>
-                </a:solidFill>
-                <a:effectLst/>
-                <a:latin typeface="Consolas" panose="020B0609020204030204" pitchFamily="49" charset="0"/>
-              </a:rPr>
-              <a:t>\n</a:t>
-            </a:r>
-            <a:r>
-              <a:rPr lang="en-IN" sz="1050" b="0" dirty="0">
-                <a:solidFill>
-                  <a:srgbClr val="50A14F"/>
-                </a:solidFill>
-                <a:effectLst/>
-                <a:latin typeface="Consolas" panose="020B0609020204030204" pitchFamily="49" charset="0"/>
-              </a:rPr>
-              <a:t>"</a:t>
-            </a:r>
-            <a:r>
-              <a:rPr lang="en-IN" sz="1050" b="0" dirty="0">
-                <a:solidFill>
-                  <a:srgbClr val="383A42"/>
-                </a:solidFill>
-                <a:effectLst/>
-                <a:latin typeface="Consolas" panose="020B0609020204030204" pitchFamily="49" charset="0"/>
-              </a:rPr>
-              <a:t>, </a:t>
-            </a:r>
-            <a:r>
-              <a:rPr lang="en-IN" sz="1050" b="0" dirty="0">
-                <a:solidFill>
-                  <a:srgbClr val="E45649"/>
-                </a:solidFill>
-                <a:effectLst/>
-                <a:latin typeface="Consolas" panose="020B0609020204030204" pitchFamily="49" charset="0"/>
-              </a:rPr>
-              <a:t>string1</a:t>
-            </a:r>
-            <a:r>
-              <a:rPr lang="en-IN" sz="1050" b="0" dirty="0">
-                <a:solidFill>
-                  <a:srgbClr val="383A42"/>
-                </a:solidFill>
-                <a:effectLst/>
-                <a:latin typeface="Consolas" panose="020B0609020204030204" pitchFamily="49" charset="0"/>
-              </a:rPr>
-              <a:t>);</a:t>
-            </a:r>
-          </a:p>
-          <a:p>
-            <a:r>
-              <a:rPr lang="en-IN" sz="1050" b="0" dirty="0">
-                <a:solidFill>
-                  <a:srgbClr val="383A42"/>
-                </a:solidFill>
-                <a:effectLst/>
-                <a:latin typeface="Consolas" panose="020B0609020204030204" pitchFamily="49" charset="0"/>
-              </a:rPr>
-              <a:t>        </a:t>
-            </a:r>
-            <a:r>
-              <a:rPr lang="en-IN" sz="1050" b="0" dirty="0">
-                <a:solidFill>
-                  <a:srgbClr val="A626A4"/>
-                </a:solidFill>
-                <a:effectLst/>
-                <a:latin typeface="Consolas" panose="020B0609020204030204" pitchFamily="49" charset="0"/>
-              </a:rPr>
-              <a:t>else</a:t>
-            </a:r>
-            <a:r>
-              <a:rPr lang="en-IN" sz="1050" b="0" dirty="0">
-                <a:solidFill>
-                  <a:srgbClr val="383A42"/>
-                </a:solidFill>
-                <a:effectLst/>
-                <a:latin typeface="Consolas" panose="020B0609020204030204" pitchFamily="49" charset="0"/>
-              </a:rPr>
-              <a:t> </a:t>
-            </a:r>
-            <a:r>
-              <a:rPr lang="en-IN" sz="1050" b="0" dirty="0">
-                <a:solidFill>
-                  <a:srgbClr val="A626A4"/>
-                </a:solidFill>
-                <a:effectLst/>
-                <a:latin typeface="Consolas" panose="020B0609020204030204" pitchFamily="49" charset="0"/>
-              </a:rPr>
-              <a:t>if</a:t>
-            </a:r>
-            <a:r>
-              <a:rPr lang="en-IN" sz="1050" b="0" dirty="0">
-                <a:solidFill>
-                  <a:srgbClr val="383A42"/>
-                </a:solidFill>
-                <a:effectLst/>
-                <a:latin typeface="Consolas" panose="020B0609020204030204" pitchFamily="49" charset="0"/>
-              </a:rPr>
-              <a:t> (</a:t>
-            </a:r>
-            <a:r>
-              <a:rPr lang="en-IN" sz="1050" b="0" dirty="0">
-                <a:solidFill>
-                  <a:srgbClr val="E45649"/>
-                </a:solidFill>
-                <a:effectLst/>
-                <a:latin typeface="Consolas" panose="020B0609020204030204" pitchFamily="49" charset="0"/>
-              </a:rPr>
-              <a:t>n</a:t>
-            </a:r>
-            <a:r>
-              <a:rPr lang="en-IN" sz="1050" b="0" dirty="0">
-                <a:solidFill>
-                  <a:srgbClr val="383A42"/>
-                </a:solidFill>
-                <a:effectLst/>
-                <a:latin typeface="Consolas" panose="020B0609020204030204" pitchFamily="49" charset="0"/>
-              </a:rPr>
-              <a:t> </a:t>
-            </a:r>
-            <a:r>
-              <a:rPr lang="en-IN" sz="1050" b="0" dirty="0">
-                <a:solidFill>
-                  <a:srgbClr val="A626A4"/>
-                </a:solidFill>
-                <a:effectLst/>
-                <a:latin typeface="Consolas" panose="020B0609020204030204" pitchFamily="49" charset="0"/>
-              </a:rPr>
-              <a:t>==</a:t>
-            </a:r>
-            <a:r>
-              <a:rPr lang="en-IN" sz="1050" b="0" dirty="0">
-                <a:solidFill>
-                  <a:srgbClr val="383A42"/>
-                </a:solidFill>
-                <a:effectLst/>
-                <a:latin typeface="Consolas" panose="020B0609020204030204" pitchFamily="49" charset="0"/>
-              </a:rPr>
-              <a:t> </a:t>
-            </a:r>
-            <a:r>
-              <a:rPr lang="en-IN" sz="1050" b="0" dirty="0">
-                <a:solidFill>
-                  <a:srgbClr val="A626A4"/>
-                </a:solidFill>
-                <a:effectLst/>
-                <a:latin typeface="Consolas" panose="020B0609020204030204" pitchFamily="49" charset="0"/>
-              </a:rPr>
-              <a:t>-</a:t>
-            </a:r>
-            <a:r>
-              <a:rPr lang="en-IN" sz="1050" b="0" dirty="0">
-                <a:solidFill>
-                  <a:srgbClr val="986801"/>
-                </a:solidFill>
-                <a:effectLst/>
-                <a:latin typeface="Consolas" panose="020B0609020204030204" pitchFamily="49" charset="0"/>
-              </a:rPr>
-              <a:t>1</a:t>
-            </a:r>
-            <a:r>
-              <a:rPr lang="en-IN" sz="1050" b="0" dirty="0">
-                <a:solidFill>
-                  <a:srgbClr val="383A42"/>
-                </a:solidFill>
-                <a:effectLst/>
-                <a:latin typeface="Consolas" panose="020B0609020204030204" pitchFamily="49" charset="0"/>
-              </a:rPr>
-              <a:t>)</a:t>
-            </a:r>
-          </a:p>
-          <a:p>
-            <a:r>
-              <a:rPr lang="en-IN" sz="1050" b="0" dirty="0">
-                <a:solidFill>
-                  <a:srgbClr val="383A42"/>
-                </a:solidFill>
-                <a:effectLst/>
-                <a:latin typeface="Consolas" panose="020B0609020204030204" pitchFamily="49" charset="0"/>
-              </a:rPr>
-              <a:t>            </a:t>
-            </a:r>
-            <a:r>
-              <a:rPr lang="en-IN" sz="1050" b="0" dirty="0">
-                <a:solidFill>
-                  <a:srgbClr val="4078F2"/>
-                </a:solidFill>
-                <a:effectLst/>
-                <a:latin typeface="Consolas" panose="020B0609020204030204" pitchFamily="49" charset="0"/>
-              </a:rPr>
-              <a:t>printf</a:t>
-            </a:r>
-            <a:r>
-              <a:rPr lang="en-IN" sz="1050" b="0" dirty="0">
-                <a:solidFill>
-                  <a:srgbClr val="383A42"/>
-                </a:solidFill>
-                <a:effectLst/>
-                <a:latin typeface="Consolas" panose="020B0609020204030204" pitchFamily="49" charset="0"/>
-              </a:rPr>
-              <a:t>(</a:t>
-            </a:r>
-            <a:r>
-              <a:rPr lang="en-IN" sz="1050" b="0" dirty="0">
-                <a:solidFill>
-                  <a:srgbClr val="50A14F"/>
-                </a:solidFill>
-                <a:effectLst/>
-                <a:latin typeface="Consolas" panose="020B0609020204030204" pitchFamily="49" charset="0"/>
-              </a:rPr>
-              <a:t>"</a:t>
-            </a:r>
-            <a:r>
-              <a:rPr lang="en-IN" sz="1050" b="0" dirty="0">
-                <a:solidFill>
-                  <a:srgbClr val="986801"/>
-                </a:solidFill>
-                <a:effectLst/>
-                <a:latin typeface="Consolas" panose="020B0609020204030204" pitchFamily="49" charset="0"/>
-              </a:rPr>
-              <a:t>%s</a:t>
-            </a:r>
-            <a:r>
-              <a:rPr lang="en-IN" sz="1050" b="0" dirty="0">
-                <a:solidFill>
-                  <a:srgbClr val="50A14F"/>
-                </a:solidFill>
-                <a:effectLst/>
-                <a:latin typeface="Consolas" panose="020B0609020204030204" pitchFamily="49" charset="0"/>
-              </a:rPr>
-              <a:t> is larger</a:t>
-            </a:r>
-            <a:r>
-              <a:rPr lang="en-IN" sz="1050" b="0" dirty="0">
-                <a:solidFill>
-                  <a:srgbClr val="0184BC"/>
-                </a:solidFill>
-                <a:effectLst/>
-                <a:latin typeface="Consolas" panose="020B0609020204030204" pitchFamily="49" charset="0"/>
-              </a:rPr>
-              <a:t>\n</a:t>
-            </a:r>
-            <a:r>
-              <a:rPr lang="en-IN" sz="1050" b="0" dirty="0">
-                <a:solidFill>
-                  <a:srgbClr val="50A14F"/>
-                </a:solidFill>
-                <a:effectLst/>
-                <a:latin typeface="Consolas" panose="020B0609020204030204" pitchFamily="49" charset="0"/>
-              </a:rPr>
-              <a:t>"</a:t>
-            </a:r>
-            <a:r>
-              <a:rPr lang="en-IN" sz="1050" b="0" dirty="0">
-                <a:solidFill>
-                  <a:srgbClr val="383A42"/>
-                </a:solidFill>
-                <a:effectLst/>
-                <a:latin typeface="Consolas" panose="020B0609020204030204" pitchFamily="49" charset="0"/>
-              </a:rPr>
-              <a:t>, </a:t>
-            </a:r>
-            <a:r>
-              <a:rPr lang="en-IN" sz="1050" b="0" dirty="0">
-                <a:solidFill>
-                  <a:srgbClr val="E45649"/>
-                </a:solidFill>
-                <a:effectLst/>
-                <a:latin typeface="Consolas" panose="020B0609020204030204" pitchFamily="49" charset="0"/>
-              </a:rPr>
-              <a:t>string2</a:t>
             </a:r>
             <a:r>
               <a:rPr lang="en-IN" sz="1050" b="0" dirty="0">
@@ -29645,7 +29370,7 @@
                 <a:effectLst/>
                 <a:latin typeface="Consolas" panose="020B0609020204030204" pitchFamily="49" charset="0"/>
               </a:rPr>
-              <a:t>"Same Strings</a:t>
+              <a:t>"Different Strings</a:t>
             </a:r>
             <a:r>
               <a:rPr lang="en-IN" sz="1050" b="0" dirty="0">
@@ -29720,18 +29445,6 @@
                 <a:latin typeface="Consolas" panose="020B0609020204030204" pitchFamily="49" charset="0"/>
               </a:rPr>
               <a:t>    }</a:t>
-            </a:r>
-          </a:p>
-          <a:p>
-            <a:r>
-              <a:rPr lang="en-IN" sz="1050" b="0" dirty="0">
-                <a:solidFill>
-                  <a:srgbClr val="383A42"/>
-                </a:solidFill>
-                <a:effectLst/>
-                <a:latin typeface="Consolas" panose="020B0609020204030204" pitchFamily="49" charset="0"/>
-              </a:rPr>
-              <a:t>    </a:t>
             </a:r>
           </a:p>
         </p:txBody>
@@ -34141,6 +33854,26 @@
                 <a:effectLst/>
                 <a:latin typeface="Consolas" panose="020B0609020204030204" pitchFamily="49" charset="0"/>
               </a:rPr>
+              <a:t>for</a:t>
+            </a:r>
+            <a:r>
+              <a:rPr lang="en-IN" sz="1050" b="0" dirty="0">
+                <a:solidFill>
+                  <a:srgbClr val="383A42"/>
+                </a:solidFill>
+                <a:effectLst/>
+                <a:latin typeface="Consolas" panose="020B0609020204030204" pitchFamily="49" charset="0"/>
+              </a:rPr>
+              <a:t> (</a:t>
+            </a:r>
+            <a:r>
+              <a:rPr lang="en-IN" sz="1050" b="0" dirty="0">
+                <a:solidFill>
+                  <a:srgbClr val="A626A4"/>
+                </a:solidFill>
+                <a:effectLst/>
+                <a:latin typeface="Consolas" panose="020B0609020204030204" pitchFamily="49" charset="0"/>
+              </a:rPr>
               <a:t>int</a:t>
             </a:r>
             <a:r>
@@ -34211,6 +33944,252 @@
                 <a:effectLst/>
                 <a:latin typeface="Consolas" panose="020B0609020204030204" pitchFamily="49" charset="0"/>
               </a:rPr>
+              <a:t>; string1[</a:t>
+            </a:r>
+            <a:r>
+              <a:rPr lang="en-IN" sz="1050" b="0" dirty="0" err="1">
+                <a:solidFill>
+                  <a:srgbClr val="E45649"/>
+                </a:solidFill>
+                <a:effectLst/>
+                <a:latin typeface="Consolas" panose="020B0609020204030204" pitchFamily="49" charset="0"/>
+              </a:rPr>
+              <a:t>i</a:t>
+            </a:r>
+            <a:r>
+              <a:rPr lang="en-IN" sz="1050" b="0" dirty="0">
+                <a:solidFill>
+                  <a:srgbClr val="383A42"/>
+                </a:solidFill>
+                <a:effectLst/>
+                <a:latin typeface="Consolas" panose="020B0609020204030204" pitchFamily="49" charset="0"/>
+              </a:rPr>
+              <a:t>] </a:t>
+            </a:r>
+            <a:r>
+              <a:rPr lang="en-IN" sz="1050" b="0" dirty="0">
+                <a:solidFill>
+                  <a:srgbClr val="A626A4"/>
+                </a:solidFill>
+                <a:effectLst/>
+                <a:latin typeface="Consolas" panose="020B0609020204030204" pitchFamily="49" charset="0"/>
+              </a:rPr>
+              <a:t>&amp;&amp;</a:t>
+            </a:r>
+            <a:r>
+              <a:rPr lang="en-IN" sz="1050" b="0" dirty="0">
+                <a:solidFill>
+                  <a:srgbClr val="383A42"/>
+                </a:solidFill>
+                <a:effectLst/>
+                <a:latin typeface="Consolas" panose="020B0609020204030204" pitchFamily="49" charset="0"/>
+              </a:rPr>
+              <a:t> string2[</a:t>
+            </a:r>
+            <a:r>
+              <a:rPr lang="en-IN" sz="1050" b="0" dirty="0" err="1">
+                <a:solidFill>
+                  <a:srgbClr val="E45649"/>
+                </a:solidFill>
+                <a:effectLst/>
+                <a:latin typeface="Consolas" panose="020B0609020204030204" pitchFamily="49" charset="0"/>
+              </a:rPr>
+              <a:t>i</a:t>
+            </a:r>
+            <a:r>
+              <a:rPr lang="en-IN" sz="1050" b="0" dirty="0">
+                <a:solidFill>
+                  <a:srgbClr val="383A42"/>
+                </a:solidFill>
+                <a:effectLst/>
+                <a:latin typeface="Consolas" panose="020B0609020204030204" pitchFamily="49" charset="0"/>
+              </a:rPr>
+              <a:t>]; </a:t>
+            </a:r>
+            <a:r>
+              <a:rPr lang="en-IN" sz="1050" b="0" dirty="0">
+                <a:solidFill>
+                  <a:srgbClr val="A626A4"/>
+                </a:solidFill>
+                <a:effectLst/>
+                <a:latin typeface="Consolas" panose="020B0609020204030204" pitchFamily="49" charset="0"/>
+              </a:rPr>
+              <a:t>++</a:t>
+            </a:r>
+            <a:r>
+              <a:rPr lang="en-IN" sz="1050" b="0" dirty="0" err="1">
+                <a:solidFill>
+                  <a:srgbClr val="E45649"/>
+                </a:solidFill>
+                <a:effectLst/>
+                <a:latin typeface="Consolas" panose="020B0609020204030204" pitchFamily="49" charset="0"/>
+              </a:rPr>
+              <a:t>i</a:t>
+            </a:r>
+            <a:r>
+              <a:rPr lang="en-IN" sz="1050" b="0" dirty="0">
+                <a:solidFill>
+                  <a:srgbClr val="383A42"/>
+                </a:solidFill>
+                <a:effectLst/>
+                <a:latin typeface="Consolas" panose="020B0609020204030204" pitchFamily="49" charset="0"/>
+              </a:rPr>
+              <a:t>)</a:t>
+            </a:r>
+          </a:p>
+          <a:p>
+            <a:r>
+              <a:rPr lang="en-IN" sz="1050" b="0" dirty="0">
+                <a:solidFill>
+                  <a:srgbClr val="383A42"/>
+                </a:solidFill>
+                <a:effectLst/>
+                <a:latin typeface="Consolas" panose="020B0609020204030204" pitchFamily="49" charset="0"/>
+              </a:rPr>
+              <a:t>    {</a:t>
+            </a:r>
+          </a:p>
+          <a:p>
+            <a:r>
+              <a:rPr lang="en-IN" sz="1050" b="0" dirty="0">
+                <a:solidFill>
+                  <a:srgbClr val="383A42"/>
+                </a:solidFill>
+                <a:effectLst/>
+                <a:latin typeface="Consolas" panose="020B0609020204030204" pitchFamily="49" charset="0"/>
+              </a:rPr>
+              <a:t>        </a:t>
+            </a:r>
+            <a:r>
+              <a:rPr lang="en-IN" sz="1050" b="0" dirty="0">
+                <a:solidFill>
+                  <a:srgbClr val="A626A4"/>
+                </a:solidFill>
+                <a:effectLst/>
+                <a:latin typeface="Consolas" panose="020B0609020204030204" pitchFamily="49" charset="0"/>
+              </a:rPr>
+              <a:t>if</a:t>
+            </a:r>
+            <a:r>
+              <a:rPr lang="en-IN" sz="1050" b="0" dirty="0">
+                <a:solidFill>
+                  <a:srgbClr val="383A42"/>
+                </a:solidFill>
+                <a:effectLst/>
+                <a:latin typeface="Consolas" panose="020B0609020204030204" pitchFamily="49" charset="0"/>
+              </a:rPr>
+              <a:t> (string1[</a:t>
+            </a:r>
+            <a:r>
+              <a:rPr lang="en-IN" sz="1050" b="0" dirty="0" err="1">
+                <a:solidFill>
+                  <a:srgbClr val="E45649"/>
+                </a:solidFill>
+                <a:effectLst/>
+                <a:latin typeface="Consolas" panose="020B0609020204030204" pitchFamily="49" charset="0"/>
+              </a:rPr>
+              <a:t>i</a:t>
+            </a:r>
+            <a:r>
+              <a:rPr lang="en-IN" sz="1050" b="0" dirty="0">
+                <a:solidFill>
+                  <a:srgbClr val="383A42"/>
+                </a:solidFill>
+                <a:effectLst/>
+                <a:latin typeface="Consolas" panose="020B0609020204030204" pitchFamily="49" charset="0"/>
+              </a:rPr>
+              <a:t>] </a:t>
+            </a:r>
+            <a:r>
+              <a:rPr lang="en-IN" sz="1050" b="0" dirty="0">
+                <a:solidFill>
+                  <a:srgbClr val="A626A4"/>
+                </a:solidFill>
+                <a:effectLst/>
+                <a:latin typeface="Consolas" panose="020B0609020204030204" pitchFamily="49" charset="0"/>
+              </a:rPr>
+              <a:t>&gt;</a:t>
+            </a:r>
+            <a:r>
+              <a:rPr lang="en-IN" sz="1050" b="0" dirty="0">
+                <a:solidFill>
+                  <a:srgbClr val="383A42"/>
+                </a:solidFill>
+                <a:effectLst/>
+                <a:latin typeface="Consolas" panose="020B0609020204030204" pitchFamily="49" charset="0"/>
+              </a:rPr>
+              <a:t> string2[</a:t>
+            </a:r>
+            <a:r>
+              <a:rPr lang="en-IN" sz="1050" b="0" dirty="0" err="1">
+                <a:solidFill>
+                  <a:srgbClr val="E45649"/>
+                </a:solidFill>
+                <a:effectLst/>
+                <a:latin typeface="Consolas" panose="020B0609020204030204" pitchFamily="49" charset="0"/>
+              </a:rPr>
+              <a:t>i</a:t>
+            </a:r>
+            <a:r>
+              <a:rPr lang="en-IN" sz="1050" b="0" dirty="0">
+                <a:solidFill>
+                  <a:srgbClr val="383A42"/>
+                </a:solidFill>
+                <a:effectLst/>
+                <a:latin typeface="Consolas" panose="020B0609020204030204" pitchFamily="49" charset="0"/>
+              </a:rPr>
+              <a:t>])</a:t>
+            </a:r>
+          </a:p>
+          <a:p>
+            <a:r>
+              <a:rPr lang="en-IN" sz="1050" b="0" dirty="0">
+                <a:solidFill>
+                  <a:srgbClr val="383A42"/>
+                </a:solidFill>
+                <a:effectLst/>
+                <a:latin typeface="Consolas" panose="020B0609020204030204" pitchFamily="49" charset="0"/>
+              </a:rPr>
+              <a:t>            </a:t>
+            </a:r>
+            <a:r>
+              <a:rPr lang="en-IN" sz="1050" b="0" dirty="0">
+                <a:solidFill>
+                  <a:srgbClr val="A626A4"/>
+                </a:solidFill>
+                <a:effectLst/>
+                <a:latin typeface="Consolas" panose="020B0609020204030204" pitchFamily="49" charset="0"/>
+              </a:rPr>
+              <a:t>return</a:t>
+            </a:r>
+            <a:r>
+              <a:rPr lang="en-IN" sz="1050" b="0" dirty="0">
+                <a:solidFill>
+                  <a:srgbClr val="383A42"/>
+                </a:solidFill>
+                <a:effectLst/>
+                <a:latin typeface="Consolas" panose="020B0609020204030204" pitchFamily="49" charset="0"/>
+              </a:rPr>
+              <a:t> </a:t>
+            </a:r>
+            <a:r>
+              <a:rPr lang="en-IN" sz="1050" b="0" dirty="0">
+                <a:solidFill>
+                  <a:srgbClr val="986801"/>
+                </a:solidFill>
+                <a:effectLst/>
+                <a:latin typeface="Consolas" panose="020B0609020204030204" pitchFamily="49" charset="0"/>
+              </a:rPr>
+              <a:t>1</a:t>
+            </a:r>
+            <a:r>
+              <a:rPr lang="en-IN" sz="1050" b="0" dirty="0">
+                <a:solidFill>
+                  <a:srgbClr val="383A42"/>
+                </a:solidFill>
+                <a:effectLst/>
+                <a:latin typeface="Consolas" panose="020B0609020204030204" pitchFamily="49" charset="0"/>
+              </a:rPr>
               <a:t>;</a:t>
             </a:r>
           </a:p>
@@ -34223,398 +34202,193 @@
                 <a:effectLst/>
                 <a:latin typeface="Consolas" panose="020B0609020204030204" pitchFamily="49" charset="0"/>
               </a:rPr>
+              <a:t>        </a:t>
+            </a:r>
+            <a:r>
+              <a:rPr lang="en-IN" sz="1050" b="0" dirty="0">
+                <a:solidFill>
+                  <a:srgbClr val="A626A4"/>
+                </a:solidFill>
+                <a:effectLst/>
+                <a:latin typeface="Consolas" panose="020B0609020204030204" pitchFamily="49" charset="0"/>
+              </a:rPr>
+              <a:t>else</a:t>
+            </a:r>
+            <a:r>
+              <a:rPr lang="en-IN" sz="1050" b="0" dirty="0">
+                <a:solidFill>
+                  <a:srgbClr val="383A42"/>
+                </a:solidFill>
+                <a:effectLst/>
+                <a:latin typeface="Consolas" panose="020B0609020204030204" pitchFamily="49" charset="0"/>
+              </a:rPr>
+              <a:t> </a:t>
+            </a:r>
+            <a:r>
+              <a:rPr lang="en-IN" sz="1050" b="0" dirty="0">
+                <a:solidFill>
+                  <a:srgbClr val="A626A4"/>
+                </a:solidFill>
+                <a:effectLst/>
+                <a:latin typeface="Consolas" panose="020B0609020204030204" pitchFamily="49" charset="0"/>
+              </a:rPr>
+              <a:t>if</a:t>
+            </a:r>
+            <a:r>
+              <a:rPr lang="en-IN" sz="1050" b="0" dirty="0">
+                <a:solidFill>
+                  <a:srgbClr val="383A42"/>
+                </a:solidFill>
+                <a:effectLst/>
+                <a:latin typeface="Consolas" panose="020B0609020204030204" pitchFamily="49" charset="0"/>
+              </a:rPr>
+              <a:t> (string1[</a:t>
+            </a:r>
+            <a:r>
+              <a:rPr lang="en-IN" sz="1050" b="0" dirty="0" err="1">
+                <a:solidFill>
+                  <a:srgbClr val="E45649"/>
+                </a:solidFill>
+                <a:effectLst/>
+                <a:latin typeface="Consolas" panose="020B0609020204030204" pitchFamily="49" charset="0"/>
+              </a:rPr>
+              <a:t>i</a:t>
+            </a:r>
+            <a:r>
+              <a:rPr lang="en-IN" sz="1050" b="0" dirty="0">
+                <a:solidFill>
+                  <a:srgbClr val="383A42"/>
+                </a:solidFill>
+                <a:effectLst/>
+                <a:latin typeface="Consolas" panose="020B0609020204030204" pitchFamily="49" charset="0"/>
+              </a:rPr>
+              <a:t>] </a:t>
+            </a:r>
+            <a:r>
+              <a:rPr lang="en-IN" sz="1050" b="0" dirty="0">
+                <a:solidFill>
+                  <a:srgbClr val="A626A4"/>
+                </a:solidFill>
+                <a:effectLst/>
+                <a:latin typeface="Consolas" panose="020B0609020204030204" pitchFamily="49" charset="0"/>
+              </a:rPr>
+              <a:t>&lt;</a:t>
+            </a:r>
+            <a:r>
+              <a:rPr lang="en-IN" sz="1050" b="0" dirty="0">
+                <a:solidFill>
+                  <a:srgbClr val="383A42"/>
+                </a:solidFill>
+                <a:effectLst/>
+                <a:latin typeface="Consolas" panose="020B0609020204030204" pitchFamily="49" charset="0"/>
+              </a:rPr>
+              <a:t> string2[</a:t>
+            </a:r>
+            <a:r>
+              <a:rPr lang="en-IN" sz="1050" b="0" dirty="0" err="1">
+                <a:solidFill>
+                  <a:srgbClr val="E45649"/>
+                </a:solidFill>
+                <a:effectLst/>
+                <a:latin typeface="Consolas" panose="020B0609020204030204" pitchFamily="49" charset="0"/>
+              </a:rPr>
+              <a:t>i</a:t>
+            </a:r>
+            <a:r>
+              <a:rPr lang="en-IN" sz="1050" b="0" dirty="0">
+                <a:solidFill>
+                  <a:srgbClr val="383A42"/>
+                </a:solidFill>
+                <a:effectLst/>
+                <a:latin typeface="Consolas" panose="020B0609020204030204" pitchFamily="49" charset="0"/>
+              </a:rPr>
+              <a:t>])</a:t>
+            </a:r>
+          </a:p>
+          <a:p>
+            <a:r>
+              <a:rPr lang="en-IN" sz="1050" b="0" dirty="0">
+                <a:solidFill>
+                  <a:srgbClr val="383A42"/>
+                </a:solidFill>
+                <a:effectLst/>
+                <a:latin typeface="Consolas" panose="020B0609020204030204" pitchFamily="49" charset="0"/>
+              </a:rPr>
+              <a:t>            </a:t>
+            </a:r>
+            <a:r>
+              <a:rPr lang="en-IN" sz="1050" b="0" dirty="0">
+                <a:solidFill>
+                  <a:srgbClr val="A626A4"/>
+                </a:solidFill>
+                <a:effectLst/>
+                <a:latin typeface="Consolas" panose="020B0609020204030204" pitchFamily="49" charset="0"/>
+              </a:rPr>
+              <a:t>return</a:t>
+            </a:r>
+            <a:r>
+              <a:rPr lang="en-IN" sz="1050" b="0" dirty="0">
+                <a:solidFill>
+                  <a:srgbClr val="383A42"/>
+                </a:solidFill>
+                <a:effectLst/>
+                <a:latin typeface="Consolas" panose="020B0609020204030204" pitchFamily="49" charset="0"/>
+              </a:rPr>
+              <a:t> </a:t>
+            </a:r>
+            <a:r>
+              <a:rPr lang="en-IN" sz="1050" b="0" dirty="0">
+                <a:solidFill>
+                  <a:srgbClr val="A626A4"/>
+                </a:solidFill>
+                <a:effectLst/>
+                <a:latin typeface="Consolas" panose="020B0609020204030204" pitchFamily="49" charset="0"/>
+              </a:rPr>
+              <a:t>-</a:t>
+            </a:r>
+            <a:r>
+              <a:rPr lang="en-IN" sz="1050" b="0" dirty="0">
+                <a:solidFill>
+                  <a:srgbClr val="986801"/>
+                </a:solidFill>
+                <a:effectLst/>
+                <a:latin typeface="Consolas" panose="020B0609020204030204" pitchFamily="49" charset="0"/>
+              </a:rPr>
+              <a:t>1</a:t>
+            </a:r>
+            <a:r>
+              <a:rPr lang="en-IN" sz="1050" b="0" dirty="0">
+                <a:solidFill>
+                  <a:srgbClr val="383A42"/>
+                </a:solidFill>
+                <a:effectLst/>
+                <a:latin typeface="Consolas" panose="020B0609020204030204" pitchFamily="49" charset="0"/>
+              </a:rPr>
+              <a:t>;</a:t>
+            </a:r>
+          </a:p>
+          <a:p>
+            <a:r>
+              <a:rPr lang="en-IN" sz="1050" b="0" dirty="0">
+                <a:solidFill>
+                  <a:srgbClr val="383A42"/>
+                </a:solidFill>
+                <a:effectLst/>
+                <a:latin typeface="Consolas" panose="020B0609020204030204" pitchFamily="49" charset="0"/>
+              </a:rPr>
+              <a:t>    }</a:t>
+            </a:r>
+          </a:p>
+          <a:p>
+            <a:r>
+              <a:rPr lang="en-IN" sz="1050" b="0" dirty="0">
+                <a:solidFill>
+                  <a:srgbClr val="383A42"/>
+                </a:solidFill>
+                <a:effectLst/>
+                <a:latin typeface="Consolas" panose="020B0609020204030204" pitchFamily="49" charset="0"/>
+              </a:rPr>
               <a:t>    </a:t>
-            </a:r>
-            <a:r>
-              <a:rPr lang="en-IN" sz="1050" b="0" dirty="0">
-                <a:solidFill>
-                  <a:srgbClr val="A626A4"/>
-                </a:solidFill>
-                <a:effectLst/>
-                <a:latin typeface="Consolas" panose="020B0609020204030204" pitchFamily="49" charset="0"/>
-              </a:rPr>
-              <a:t>while</a:t>
-            </a:r>
-            <a:r>
-              <a:rPr lang="en-IN" sz="1050" b="0" dirty="0">
-                <a:solidFill>
-                  <a:srgbClr val="383A42"/>
-                </a:solidFill>
-                <a:effectLst/>
-                <a:latin typeface="Consolas" panose="020B0609020204030204" pitchFamily="49" charset="0"/>
-              </a:rPr>
-              <a:t> (string1[</a:t>
-            </a:r>
-            <a:r>
-              <a:rPr lang="en-IN" sz="1050" b="0" dirty="0" err="1">
-                <a:solidFill>
-                  <a:srgbClr val="E45649"/>
-                </a:solidFill>
-                <a:effectLst/>
-                <a:latin typeface="Consolas" panose="020B0609020204030204" pitchFamily="49" charset="0"/>
-              </a:rPr>
-              <a:t>i</a:t>
-            </a:r>
-            <a:r>
-              <a:rPr lang="en-IN" sz="1050" b="0" dirty="0">
-                <a:solidFill>
-                  <a:srgbClr val="A626A4"/>
-                </a:solidFill>
-                <a:effectLst/>
-                <a:latin typeface="Consolas" panose="020B0609020204030204" pitchFamily="49" charset="0"/>
-              </a:rPr>
-              <a:t>++</a:t>
-            </a:r>
-            <a:r>
-              <a:rPr lang="en-IN" sz="1050" b="0" dirty="0">
-                <a:solidFill>
-                  <a:srgbClr val="383A42"/>
-                </a:solidFill>
-                <a:effectLst/>
-                <a:latin typeface="Consolas" panose="020B0609020204030204" pitchFamily="49" charset="0"/>
-              </a:rPr>
-              <a:t>] </a:t>
-            </a:r>
-            <a:r>
-              <a:rPr lang="en-IN" sz="1050" b="0" dirty="0">
-                <a:solidFill>
-                  <a:srgbClr val="A626A4"/>
-                </a:solidFill>
-                <a:effectLst/>
-                <a:latin typeface="Consolas" panose="020B0609020204030204" pitchFamily="49" charset="0"/>
-              </a:rPr>
-              <a:t>&amp;&amp;</a:t>
-            </a:r>
-            <a:r>
-              <a:rPr lang="en-IN" sz="1050" b="0" dirty="0">
-                <a:solidFill>
-                  <a:srgbClr val="383A42"/>
-                </a:solidFill>
-                <a:effectLst/>
-                <a:latin typeface="Consolas" panose="020B0609020204030204" pitchFamily="49" charset="0"/>
-              </a:rPr>
-              <a:t> string2[</a:t>
-            </a:r>
-            <a:r>
-              <a:rPr lang="en-IN" sz="1050" b="0" dirty="0" err="1">
-                <a:solidFill>
-                  <a:srgbClr val="E45649"/>
-                </a:solidFill>
-                <a:effectLst/>
-                <a:latin typeface="Consolas" panose="020B0609020204030204" pitchFamily="49" charset="0"/>
-              </a:rPr>
-              <a:t>i</a:t>
-            </a:r>
-            <a:r>
-              <a:rPr lang="en-IN" sz="1050" b="0" dirty="0">
-                <a:solidFill>
-                  <a:srgbClr val="A626A4"/>
-                </a:solidFill>
-                <a:effectLst/>
-                <a:latin typeface="Consolas" panose="020B0609020204030204" pitchFamily="49" charset="0"/>
-              </a:rPr>
-              <a:t>++</a:t>
-            </a:r>
-            <a:r>
-              <a:rPr lang="en-IN" sz="1050" b="0" dirty="0">
-                <a:solidFill>
-                  <a:srgbClr val="383A42"/>
-                </a:solidFill>
-                <a:effectLst/>
-                <a:latin typeface="Consolas" panose="020B0609020204030204" pitchFamily="49" charset="0"/>
-              </a:rPr>
-              <a:t>])</a:t>
-            </a:r>
-          </a:p>
-          <a:p>
-            <a:r>
-              <a:rPr lang="en-IN" sz="1050" b="0" dirty="0">
-                <a:solidFill>
-                  <a:srgbClr val="383A42"/>
-                </a:solidFill>
-                <a:effectLst/>
-                <a:latin typeface="Consolas" panose="020B0609020204030204" pitchFamily="49" charset="0"/>
-              </a:rPr>
-              <a:t>        ;</a:t>
-            </a:r>
-          </a:p>
-          <a:p>
-            <a:r>
-              <a:rPr lang="en-IN" sz="1050" b="0" dirty="0">
-                <a:solidFill>
-                  <a:srgbClr val="383A42"/>
-                </a:solidFill>
-                <a:effectLst/>
-                <a:latin typeface="Consolas" panose="020B0609020204030204" pitchFamily="49" charset="0"/>
-              </a:rPr>
-              <a:t>    </a:t>
-            </a:r>
-            <a:r>
-              <a:rPr lang="en-IN" sz="1050" b="0" dirty="0">
-                <a:solidFill>
-                  <a:srgbClr val="A626A4"/>
-                </a:solidFill>
-                <a:effectLst/>
-                <a:latin typeface="Consolas" panose="020B0609020204030204" pitchFamily="49" charset="0"/>
-              </a:rPr>
-              <a:t>if</a:t>
-            </a:r>
-            <a:r>
-              <a:rPr lang="en-IN" sz="1050" b="0" dirty="0">
-                <a:solidFill>
-                  <a:srgbClr val="383A42"/>
-                </a:solidFill>
-                <a:effectLst/>
-                <a:latin typeface="Consolas" panose="020B0609020204030204" pitchFamily="49" charset="0"/>
-              </a:rPr>
-              <a:t> (string1[</a:t>
-            </a:r>
-            <a:r>
-              <a:rPr lang="en-IN" sz="1050" b="0" dirty="0" err="1">
-                <a:solidFill>
-                  <a:srgbClr val="E45649"/>
-                </a:solidFill>
-                <a:effectLst/>
-                <a:latin typeface="Consolas" panose="020B0609020204030204" pitchFamily="49" charset="0"/>
-              </a:rPr>
-              <a:t>i</a:t>
-            </a:r>
-            <a:r>
-              <a:rPr lang="en-IN" sz="1050" b="0" dirty="0">
-                <a:solidFill>
-                  <a:srgbClr val="383A42"/>
-                </a:solidFill>
-                <a:effectLst/>
-                <a:latin typeface="Consolas" panose="020B0609020204030204" pitchFamily="49" charset="0"/>
-              </a:rPr>
-              <a:t>])</a:t>
-            </a:r>
-          </a:p>
-          <a:p>
-            <a:r>
-              <a:rPr lang="en-IN" sz="1050" b="0" dirty="0">
-                <a:solidFill>
-                  <a:srgbClr val="383A42"/>
-                </a:solidFill>
-                <a:effectLst/>
-                <a:latin typeface="Consolas" panose="020B0609020204030204" pitchFamily="49" charset="0"/>
-              </a:rPr>
-              <a:t>        </a:t>
-            </a:r>
-            <a:r>
-              <a:rPr lang="en-IN" sz="1050" b="0" dirty="0">
-                <a:solidFill>
-                  <a:srgbClr val="A626A4"/>
-                </a:solidFill>
-                <a:effectLst/>
-                <a:latin typeface="Consolas" panose="020B0609020204030204" pitchFamily="49" charset="0"/>
-              </a:rPr>
-              <a:t>return</a:t>
-            </a:r>
-            <a:r>
-              <a:rPr lang="en-IN" sz="1050" b="0" dirty="0">
-                <a:solidFill>
-                  <a:srgbClr val="383A42"/>
-                </a:solidFill>
-                <a:effectLst/>
-                <a:latin typeface="Consolas" panose="020B0609020204030204" pitchFamily="49" charset="0"/>
-              </a:rPr>
-              <a:t> </a:t>
-            </a:r>
-            <a:r>
-              <a:rPr lang="en-IN" sz="1050" b="0" dirty="0">
-                <a:solidFill>
-                  <a:srgbClr val="986801"/>
-                </a:solidFill>
-                <a:effectLst/>
-                <a:latin typeface="Consolas" panose="020B0609020204030204" pitchFamily="49" charset="0"/>
-              </a:rPr>
-              <a:t>1</a:t>
-            </a:r>
-            <a:r>
-              <a:rPr lang="en-IN" sz="1050" b="0" dirty="0">
-                <a:solidFill>
-                  <a:srgbClr val="383A42"/>
-                </a:solidFill>
-                <a:effectLst/>
-                <a:latin typeface="Consolas" panose="020B0609020204030204" pitchFamily="49" charset="0"/>
-              </a:rPr>
-              <a:t>;</a:t>
-            </a:r>
-          </a:p>
-          <a:p>
-            <a:r>
-              <a:rPr lang="en-IN" sz="1050" b="0" dirty="0">
-                <a:solidFill>
-                  <a:srgbClr val="383A42"/>
-                </a:solidFill>
-                <a:effectLst/>
-                <a:latin typeface="Consolas" panose="020B0609020204030204" pitchFamily="49" charset="0"/>
-              </a:rPr>
-              <a:t>    </a:t>
-            </a:r>
-            <a:r>
-              <a:rPr lang="en-IN" sz="1050" b="0" dirty="0">
-                <a:solidFill>
-                  <a:srgbClr val="A626A4"/>
-                </a:solidFill>
-                <a:effectLst/>
-                <a:latin typeface="Consolas" panose="020B0609020204030204" pitchFamily="49" charset="0"/>
-              </a:rPr>
-              <a:t>else</a:t>
-            </a:r>
-            <a:r>
-              <a:rPr lang="en-IN" sz="1050" b="0" dirty="0">
-                <a:solidFill>
-                  <a:srgbClr val="383A42"/>
-                </a:solidFill>
-                <a:effectLst/>
-                <a:latin typeface="Consolas" panose="020B0609020204030204" pitchFamily="49" charset="0"/>
-              </a:rPr>
-              <a:t> </a:t>
-            </a:r>
-            <a:r>
-              <a:rPr lang="en-IN" sz="1050" b="0" dirty="0">
-                <a:solidFill>
-                  <a:srgbClr val="A626A4"/>
-                </a:solidFill>
-                <a:effectLst/>
-                <a:latin typeface="Consolas" panose="020B0609020204030204" pitchFamily="49" charset="0"/>
-              </a:rPr>
-              <a:t>if</a:t>
-            </a:r>
-            <a:r>
-              <a:rPr lang="en-IN" sz="1050" b="0" dirty="0">
-                <a:solidFill>
-                  <a:srgbClr val="383A42"/>
-                </a:solidFill>
-                <a:effectLst/>
-                <a:latin typeface="Consolas" panose="020B0609020204030204" pitchFamily="49" charset="0"/>
-              </a:rPr>
-              <a:t> (string2[</a:t>
-            </a:r>
-            <a:r>
-              <a:rPr lang="en-IN" sz="1050" b="0" dirty="0" err="1">
-                <a:solidFill>
-                  <a:srgbClr val="E45649"/>
-                </a:solidFill>
-                <a:effectLst/>
-                <a:latin typeface="Consolas" panose="020B0609020204030204" pitchFamily="49" charset="0"/>
-              </a:rPr>
-              <a:t>i</a:t>
-            </a:r>
-            <a:r>
-              <a:rPr lang="en-IN" sz="1050" b="0" dirty="0">
-                <a:solidFill>
-                  <a:srgbClr val="383A42"/>
-                </a:solidFill>
-                <a:effectLst/>
-                <a:latin typeface="Consolas" panose="020B0609020204030204" pitchFamily="49" charset="0"/>
-              </a:rPr>
-              <a:t>])</a:t>
-            </a:r>
-          </a:p>
-          <a:p>
-            <a:r>
-              <a:rPr lang="en-IN" sz="1050" b="0" dirty="0">
-                <a:solidFill>
-                  <a:srgbClr val="383A42"/>
-                </a:solidFill>
-                <a:effectLst/>
-                <a:latin typeface="Consolas" panose="020B0609020204030204" pitchFamily="49" charset="0"/>
-              </a:rPr>
-              <a:t>        </a:t>
-            </a:r>
-            <a:r>
-              <a:rPr lang="en-IN" sz="1050" b="0" dirty="0">
-                <a:solidFill>
-                  <a:srgbClr val="A626A4"/>
-                </a:solidFill>
-                <a:effectLst/>
-                <a:latin typeface="Consolas" panose="020B0609020204030204" pitchFamily="49" charset="0"/>
-              </a:rPr>
-              <a:t>return</a:t>
-            </a:r>
-            <a:r>
-              <a:rPr lang="en-IN" sz="1050" b="0" dirty="0">
-                <a:solidFill>
-                  <a:srgbClr val="383A42"/>
-                </a:solidFill>
-                <a:effectLst/>
-                <a:latin typeface="Consolas" panose="020B0609020204030204" pitchFamily="49" charset="0"/>
-              </a:rPr>
-              <a:t> </a:t>
-            </a:r>
-            <a:r>
-              <a:rPr lang="en-IN" sz="1050" b="0" dirty="0">
-                <a:solidFill>
-                  <a:srgbClr val="A626A4"/>
-                </a:solidFill>
-                <a:effectLst/>
-                <a:latin typeface="Consolas" panose="020B0609020204030204" pitchFamily="49" charset="0"/>
-              </a:rPr>
-              <a:t>-</a:t>
-            </a:r>
-            <a:r>
-              <a:rPr lang="en-IN" sz="1050" b="0" dirty="0">
-                <a:solidFill>
-                  <a:srgbClr val="986801"/>
-                </a:solidFill>
-                <a:effectLst/>
-                <a:latin typeface="Consolas" panose="020B0609020204030204" pitchFamily="49" charset="0"/>
-              </a:rPr>
-              <a:t>1</a:t>
-            </a:r>
-            <a:r>
-              <a:rPr lang="en-IN" sz="1050" b="0" dirty="0">
-                <a:solidFill>
-                  <a:srgbClr val="383A42"/>
-                </a:solidFill>
-                <a:effectLst/>
-                <a:latin typeface="Consolas" panose="020B0609020204030204" pitchFamily="49" charset="0"/>
-              </a:rPr>
-              <a:t>;</a:t>
-            </a:r>
-          </a:p>
-          <a:p>
-            <a:r>
-              <a:rPr lang="en-IN" sz="1050" b="0" dirty="0">
-                <a:solidFill>
-                  <a:srgbClr val="383A42"/>
-                </a:solidFill>
-                <a:effectLst/>
-                <a:latin typeface="Consolas" panose="020B0609020204030204" pitchFamily="49" charset="0"/>
-              </a:rPr>
-              <a:t>    </a:t>
-            </a:r>
-            <a:r>
-              <a:rPr lang="en-IN" sz="1050" b="0" dirty="0">
-                <a:solidFill>
-                  <a:srgbClr val="A626A4"/>
-                </a:solidFill>
-                <a:effectLst/>
-                <a:latin typeface="Consolas" panose="020B0609020204030204" pitchFamily="49" charset="0"/>
-              </a:rPr>
-              <a:t>else</a:t>
-            </a:r>
-            <a:endParaRPr lang="en-IN" sz="1050" b="0" dirty="0">
-              <a:solidFill>
-                <a:srgbClr val="383A42"/>
-              </a:solidFill>
-              <a:effectLst/>
-              <a:latin typeface="Consolas" panose="020B0609020204030204" pitchFamily="49" charset="0"/>
-            </a:endParaRPr>
-          </a:p>
-          <a:p>
-            <a:r>
-              <a:rPr lang="en-IN" sz="1050" b="0" dirty="0">
-                <a:solidFill>
-                  <a:srgbClr val="383A42"/>
-                </a:solidFill>
-                <a:effectLst/>
-                <a:latin typeface="Consolas" panose="020B0609020204030204" pitchFamily="49" charset="0"/>
-              </a:rPr>
-              <a:t>        </a:t>
             </a:r>
             <a:r>
               <a:rPr lang="en-IN" sz="1050" b="0" dirty="0">
@@ -36877,6 +36651,23 @@
 </file>
 
 <file path=customXml/item1.xml><?xml version="1.0" encoding="utf-8"?>
+<p:properties xmlns:p="http://schemas.microsoft.com/office/2006/metadata/properties" xmlns:xsi="http://www.w3.org/2001/XMLSchema-instance" xmlns:pc="http://schemas.microsoft.com/office/infopath/2007/PartnerControls">
+  <documentManagement>
+    <MediaServiceKeyPoints xmlns="ef88797d-310b-4d46-ad9c-0c23fa0c8d45" xsi:nil="true"/>
+  </documentManagement>
+</p:properties>
+</file>
+
+<file path=customXml/item2.xml><?xml version="1.0" encoding="utf-8"?>
+<?mso-contentType ?>
+<FormTemplates xmlns="http://schemas.microsoft.com/sharepoint/v3/contenttype/forms">
+  <Display>DocumentLibraryForm</Display>
+  <Edit>DocumentLibraryForm</Edit>
+  <New>DocumentLibraryForm</New>
+</FormTemplates>
+</file>
+
+<file path=customXml/item3.xml><?xml version="1.0" encoding="utf-8"?>
 <ct:contentTypeSchema xmlns:ct="http://schemas.microsoft.com/office/2006/metadata/contentType" xmlns:ma="http://schemas.microsoft.com/office/2006/metadata/properties/metaAttributes" ct:_="" ma:_="" ma:contentTypeName="Document" ma:contentTypeID="0x0101005F02E0EF7D44C04B9FA644DBFF45FF6A" ma:contentTypeVersion="13" ma:contentTypeDescription="Create a new document." ma:contentTypeScope="" ma:versionID="206b9469efed5238e3299da57cdc015e">
   <xsd:schema xmlns:xsd="http://www.w3.org/2001/XMLSchema" xmlns:xs="http://www.w3.org/2001/XMLSchema" xmlns:p="http://schemas.microsoft.com/office/2006/metadata/properties" xmlns:ns2="876de33e-aaa5-4507-9b92-b84e676ded0d" xmlns:ns3="ef88797d-310b-4d46-ad9c-0c23fa0c8d45" targetNamespace="http://schemas.microsoft.com/office/2006/metadata/properties" ma:root="true" ma:fieldsID="281ed500249cd3fe925a7af84a8b56c4" ns2:_="" ns3:_="">
     <xsd:import namespace="876de33e-aaa5-4507-9b92-b84e676ded0d"/>
@@ -37099,24 +36890,25 @@
 </ct:contentTypeSchema>
 </file>
 
-<file path=customXml/item2.xml><?xml version="1.0" encoding="utf-8"?>
-<?mso-contentType ?>
-<FormTemplates xmlns="http://schemas.microsoft.com/sharepoint/v3/contenttype/forms">
-  <Display>DocumentLibraryForm</Display>
-  <Edit>DocumentLibraryForm</Edit>
-  <New>DocumentLibraryForm</New>
-</FormTemplates>
+<file path=customXml/itemProps1.xml><?xml version="1.0" encoding="utf-8"?>
+<ds:datastoreItem xmlns:ds="http://schemas.openxmlformats.org/officeDocument/2006/customXml" ds:itemID="{64FC06E3-0E84-4E3F-B416-FB828DCF9B7F}">
+  <ds:schemaRefs>
+    <ds:schemaRef ds:uri="http://schemas.microsoft.com/office/2006/metadata/properties"/>
+    <ds:schemaRef ds:uri="http://schemas.microsoft.com/office/infopath/2007/PartnerControls"/>
+    <ds:schemaRef ds:uri="ef88797d-310b-4d46-ad9c-0c23fa0c8d45"/>
+  </ds:schemaRefs>
+</ds:datastoreItem>
 </file>
 
-<file path=customXml/item3.xml><?xml version="1.0" encoding="utf-8"?>
-<p:properties xmlns:p="http://schemas.microsoft.com/office/2006/metadata/properties" xmlns:xsi="http://www.w3.org/2001/XMLSchema-instance" xmlns:pc="http://schemas.microsoft.com/office/infopath/2007/PartnerControls">
-  <documentManagement>
-    <MediaServiceKeyPoints xmlns="ef88797d-310b-4d46-ad9c-0c23fa0c8d45" xsi:nil="true"/>
-  </documentManagement>
-</p:properties>
+<file path=customXml/itemProps2.xml><?xml version="1.0" encoding="utf-8"?>
+<ds:datastoreItem xmlns:ds="http://schemas.openxmlformats.org/officeDocument/2006/customXml" ds:itemID="{6CC8330E-9243-41D2-B668-95E77A525F12}">
+  <ds:schemaRefs>
+    <ds:schemaRef ds:uri="http://schemas.microsoft.com/sharepoint/v3/contenttype/forms"/>
+  </ds:schemaRefs>
+</ds:datastoreItem>
 </file>
 
-<file path=customXml/itemProps1.xml><?xml version="1.0" encoding="utf-8"?>
+<file path=customXml/itemProps3.xml><?xml version="1.0" encoding="utf-8"?>
 <ds:datastoreItem xmlns:ds="http://schemas.openxmlformats.org/officeDocument/2006/customXml" ds:itemID="{6C0558B0-8C20-4473-953C-1BB329A85EE1}">
   <ds:schemaRefs>
     <ds:schemaRef ds:uri="http://schemas.microsoft.com/office/2006/metadata/contentType"/>
@@ -37133,22 +36925,4 @@
     <ds:schemaRef ds:uri="http://schemas.microsoft.com/internal/obd"/>
   </ds:schemaRefs>
 </ds:datastoreItem>
-</file>
-
-<file path=customXml/itemProps2.xml><?xml version="1.0" encoding="utf-8"?>
-<ds:datastoreItem xmlns:ds="http://schemas.openxmlformats.org/officeDocument/2006/customXml" ds:itemID="{6CC8330E-9243-41D2-B668-95E77A525F12}">
-  <ds:schemaRefs>
-    <ds:schemaRef ds:uri="http://schemas.microsoft.com/sharepoint/v3/contenttype/forms"/>
-  </ds:schemaRefs>
-</ds:datastoreItem>
-</file>
-
-<file path=customXml/itemProps3.xml><?xml version="1.0" encoding="utf-8"?>
-<ds:datastoreItem xmlns:ds="http://schemas.openxmlformats.org/officeDocument/2006/customXml" ds:itemID="{64FC06E3-0E84-4E3F-B416-FB828DCF9B7F}">
-  <ds:schemaRefs>
-    <ds:schemaRef ds:uri="http://schemas.microsoft.com/office/2006/metadata/properties"/>
-    <ds:schemaRef ds:uri="http://schemas.microsoft.com/office/infopath/2007/PartnerControls"/>
-    <ds:schemaRef ds:uri="ef88797d-310b-4d46-ad9c-0c23fa0c8d45"/>
-  </ds:schemaRefs>
-</ds:datastoreItem>
 </file>
</xml_diff>